<commit_message>
added beforeScenario in the stubs
</commit_message>
<xml_diff>
--- a/Doc/AppInfo.pptx
+++ b/Doc/AppInfo.pptx
@@ -4963,7 +4963,7 @@
         <p:spPr>
           <a:xfrm>
             <a:off x="1115616" y="1052736"/>
-            <a:ext cx="6696744" cy="2031325"/>
+            <a:ext cx="6696744" cy="2308324"/>
           </a:xfrm>
           <a:prstGeom prst="rect">
             <a:avLst/>
@@ -5005,20 +5005,12 @@
               <a:buChar char="•"/>
             </a:pPr>
             <a:r>
-              <a:rPr lang="en-US" smtClean="0">
-                <a:solidFill>
-                  <a:srgbClr val="00B050"/>
-                </a:solidFill>
-              </a:rPr>
-              <a:t>implementing a default mechanism for </a:t>
-            </a:r>
-            <a:r>
               <a:rPr lang="en-US" dirty="0" smtClean="0">
                 <a:solidFill>
                   <a:srgbClr val="00B050"/>
                 </a:solidFill>
               </a:rPr>
-              <a:t>production that inject via code</a:t>
+              <a:t>implementing a default mechanism for production that inject via code</a:t>
             </a:r>
           </a:p>
           <a:p>
@@ -5048,7 +5040,15 @@
                   <a:srgbClr val="00B050"/>
                 </a:solidFill>
               </a:rPr>
-              <a:t> with a more performant framework</a:t>
+              <a:t> with a more performant </a:t>
+            </a:r>
+            <a:r>
+              <a:rPr lang="en-US" dirty="0" smtClean="0">
+                <a:solidFill>
+                  <a:srgbClr val="00B050"/>
+                </a:solidFill>
+              </a:rPr>
+              <a:t>framework (Ninject has been classified as one of the slowest)</a:t>
             </a:r>
             <a:endParaRPr lang="en-US" dirty="0">
               <a:solidFill>
@@ -5058,60 +5058,6 @@
           </a:p>
         </p:txBody>
       </p:sp>
-      <p:pic>
-        <p:nvPicPr>
-          <p:cNvPr id="1026" name="Picture 2"/>
-          <p:cNvPicPr>
-            <a:picLocks noChangeAspect="1" noChangeArrowheads="1"/>
-          </p:cNvPicPr>
-          <p:nvPr/>
-        </p:nvPicPr>
-        <p:blipFill>
-          <a:blip r:embed="rId2">
-            <a:extLst>
-              <a:ext uri="{28A0092B-C50C-407E-A947-70E740481C1C}">
-                <a14:useLocalDpi xmlns:a14="http://schemas.microsoft.com/office/drawing/2010/main" val="0"/>
-              </a:ext>
-            </a:extLst>
-          </a:blip>
-          <a:srcRect/>
-          <a:stretch>
-            <a:fillRect/>
-          </a:stretch>
-        </p:blipFill>
-        <p:spPr bwMode="auto">
-          <a:xfrm>
-            <a:off x="1547664" y="3080530"/>
-            <a:ext cx="5991225" cy="3581400"/>
-          </a:xfrm>
-          <a:prstGeom prst="rect">
-            <a:avLst/>
-          </a:prstGeom>
-          <a:noFill/>
-          <a:ln>
-            <a:noFill/>
-          </a:ln>
-          <a:extLst>
-            <a:ext uri="{909E8E84-426E-40DD-AFC4-6F175D3DCCD1}">
-              <a14:hiddenFill xmlns:a14="http://schemas.microsoft.com/office/drawing/2010/main">
-                <a:solidFill>
-                  <a:schemeClr val="accent1"/>
-                </a:solidFill>
-              </a14:hiddenFill>
-            </a:ext>
-            <a:ext uri="{91240B29-F687-4F45-9708-019B960494DF}">
-              <a14:hiddenLine xmlns:a14="http://schemas.microsoft.com/office/drawing/2010/main" w="9525">
-                <a:solidFill>
-                  <a:schemeClr val="tx1"/>
-                </a:solidFill>
-                <a:miter lim="800000"/>
-                <a:headEnd/>
-                <a:tailEnd/>
-              </a14:hiddenLine>
-            </a:ext>
-          </a:extLst>
-        </p:spPr>
-      </p:pic>
     </p:spTree>
     <p:extLst>
       <p:ext uri="{BB962C8B-B14F-4D97-AF65-F5344CB8AC3E}">

</xml_diff>